<commit_message>
Updated the latest wireframe
</commit_message>
<xml_diff>
--- a/HTML-CSS-JS-Assessment_Wireframe.pptx
+++ b/HTML-CSS-JS-Assessment_Wireframe.pptx
@@ -6,10 +6,8 @@
   </p:sldMasterIdLst>
   <p:sldIdLst>
     <p:sldId id="256" r:id="rId2"/>
-    <p:sldId id="259" r:id="rId3"/>
-    <p:sldId id="260" r:id="rId4"/>
-    <p:sldId id="261" r:id="rId5"/>
-    <p:sldId id="262" r:id="rId6"/>
+    <p:sldId id="261" r:id="rId3"/>
+    <p:sldId id="262" r:id="rId4"/>
   </p:sldIdLst>
   <p:sldSz cx="12192000" cy="6858000"/>
   <p:notesSz cx="6858000" cy="9144000"/>
@@ -108,6 +106,11 @@
       </a:defRPr>
     </a:lvl9pPr>
   </p:defaultTextStyle>
+  <p:extLst>
+    <p:ext uri="{EFAFB233-063F-42B5-8137-9DF3F51BA10A}">
+      <p15:sldGuideLst xmlns:p15="http://schemas.microsoft.com/office/powerpoint/2012/main"/>
+    </p:ext>
+  </p:extLst>
 </p:presentation>
 </file>
 
@@ -833,7 +836,7 @@
           <a:p>
             <a:fld id="{C830FB6D-93FB-4594-B51C-2FF6E01B330D}" type="datetimeFigureOut">
               <a:rPr lang="en-AU" smtClean="0"/>
-              <a:t>8/04/2022</a:t>
+              <a:t>12/04/2022</a:t>
             </a:fld>
             <a:endParaRPr lang="en-AU"/>
           </a:p>
@@ -1084,7 +1087,7 @@
           <a:p>
             <a:fld id="{C830FB6D-93FB-4594-B51C-2FF6E01B330D}" type="datetimeFigureOut">
               <a:rPr lang="en-AU" smtClean="0"/>
-              <a:t>8/04/2022</a:t>
+              <a:t>12/04/2022</a:t>
             </a:fld>
             <a:endParaRPr lang="en-AU"/>
           </a:p>
@@ -1398,7 +1401,7 @@
           <a:p>
             <a:fld id="{C830FB6D-93FB-4594-B51C-2FF6E01B330D}" type="datetimeFigureOut">
               <a:rPr lang="en-AU" smtClean="0"/>
-              <a:t>8/04/2022</a:t>
+              <a:t>12/04/2022</a:t>
             </a:fld>
             <a:endParaRPr lang="en-AU"/>
           </a:p>
@@ -1739,7 +1742,7 @@
           <a:p>
             <a:fld id="{C830FB6D-93FB-4594-B51C-2FF6E01B330D}" type="datetimeFigureOut">
               <a:rPr lang="en-AU" smtClean="0"/>
-              <a:t>8/04/2022</a:t>
+              <a:t>12/04/2022</a:t>
             </a:fld>
             <a:endParaRPr lang="en-AU"/>
           </a:p>
@@ -2053,7 +2056,7 @@
           <a:p>
             <a:fld id="{C830FB6D-93FB-4594-B51C-2FF6E01B330D}" type="datetimeFigureOut">
               <a:rPr lang="en-AU" smtClean="0"/>
-              <a:t>8/04/2022</a:t>
+              <a:t>12/04/2022</a:t>
             </a:fld>
             <a:endParaRPr lang="en-AU"/>
           </a:p>
@@ -2446,7 +2449,7 @@
           <a:p>
             <a:fld id="{C830FB6D-93FB-4594-B51C-2FF6E01B330D}" type="datetimeFigureOut">
               <a:rPr lang="en-AU" smtClean="0"/>
-              <a:t>8/04/2022</a:t>
+              <a:t>12/04/2022</a:t>
             </a:fld>
             <a:endParaRPr lang="en-AU"/>
           </a:p>
@@ -2616,7 +2619,7 @@
           <a:p>
             <a:fld id="{C830FB6D-93FB-4594-B51C-2FF6E01B330D}" type="datetimeFigureOut">
               <a:rPr lang="en-AU" smtClean="0"/>
-              <a:t>8/04/2022</a:t>
+              <a:t>12/04/2022</a:t>
             </a:fld>
             <a:endParaRPr lang="en-AU"/>
           </a:p>
@@ -2796,7 +2799,7 @@
           <a:p>
             <a:fld id="{C830FB6D-93FB-4594-B51C-2FF6E01B330D}" type="datetimeFigureOut">
               <a:rPr lang="en-AU" smtClean="0"/>
-              <a:t>8/04/2022</a:t>
+              <a:t>12/04/2022</a:t>
             </a:fld>
             <a:endParaRPr lang="en-AU"/>
           </a:p>
@@ -2972,7 +2975,7 @@
           <a:p>
             <a:fld id="{C830FB6D-93FB-4594-B51C-2FF6E01B330D}" type="datetimeFigureOut">
               <a:rPr lang="en-AU" smtClean="0"/>
-              <a:t>8/04/2022</a:t>
+              <a:t>12/04/2022</a:t>
             </a:fld>
             <a:endParaRPr lang="en-AU"/>
           </a:p>
@@ -3219,7 +3222,7 @@
           <a:p>
             <a:fld id="{C830FB6D-93FB-4594-B51C-2FF6E01B330D}" type="datetimeFigureOut">
               <a:rPr lang="en-AU" smtClean="0"/>
-              <a:t>8/04/2022</a:t>
+              <a:t>12/04/2022</a:t>
             </a:fld>
             <a:endParaRPr lang="en-AU"/>
           </a:p>
@@ -3451,7 +3454,7 @@
           <a:p>
             <a:fld id="{C830FB6D-93FB-4594-B51C-2FF6E01B330D}" type="datetimeFigureOut">
               <a:rPr lang="en-AU" smtClean="0"/>
-              <a:t>8/04/2022</a:t>
+              <a:t>12/04/2022</a:t>
             </a:fld>
             <a:endParaRPr lang="en-AU"/>
           </a:p>
@@ -3825,7 +3828,7 @@
           <a:p>
             <a:fld id="{C830FB6D-93FB-4594-B51C-2FF6E01B330D}" type="datetimeFigureOut">
               <a:rPr lang="en-AU" smtClean="0"/>
-              <a:t>8/04/2022</a:t>
+              <a:t>12/04/2022</a:t>
             </a:fld>
             <a:endParaRPr lang="en-AU"/>
           </a:p>
@@ -3948,7 +3951,7 @@
           <a:p>
             <a:fld id="{C830FB6D-93FB-4594-B51C-2FF6E01B330D}" type="datetimeFigureOut">
               <a:rPr lang="en-AU" smtClean="0"/>
-              <a:t>8/04/2022</a:t>
+              <a:t>12/04/2022</a:t>
             </a:fld>
             <a:endParaRPr lang="en-AU"/>
           </a:p>
@@ -4043,7 +4046,7 @@
           <a:p>
             <a:fld id="{C830FB6D-93FB-4594-B51C-2FF6E01B330D}" type="datetimeFigureOut">
               <a:rPr lang="en-AU" smtClean="0"/>
-              <a:t>8/04/2022</a:t>
+              <a:t>12/04/2022</a:t>
             </a:fld>
             <a:endParaRPr lang="en-AU"/>
           </a:p>
@@ -4298,7 +4301,7 @@
           <a:p>
             <a:fld id="{C830FB6D-93FB-4594-B51C-2FF6E01B330D}" type="datetimeFigureOut">
               <a:rPr lang="en-AU" smtClean="0"/>
-              <a:t>8/04/2022</a:t>
+              <a:t>12/04/2022</a:t>
             </a:fld>
             <a:endParaRPr lang="en-AU"/>
           </a:p>
@@ -4561,7 +4564,7 @@
           <a:p>
             <a:fld id="{C830FB6D-93FB-4594-B51C-2FF6E01B330D}" type="datetimeFigureOut">
               <a:rPr lang="en-AU" smtClean="0"/>
-              <a:t>8/04/2022</a:t>
+              <a:t>12/04/2022</a:t>
             </a:fld>
             <a:endParaRPr lang="en-AU"/>
           </a:p>
@@ -5304,7 +5307,7 @@
           <a:p>
             <a:fld id="{C830FB6D-93FB-4594-B51C-2FF6E01B330D}" type="datetimeFigureOut">
               <a:rPr lang="en-AU" smtClean="0"/>
-              <a:t>8/04/2022</a:t>
+              <a:t>12/04/2022</a:t>
             </a:fld>
             <a:endParaRPr lang="en-AU"/>
           </a:p>
@@ -6214,254 +6217,7 @@
         </p:nvSpPr>
         <p:spPr>
           <a:xfrm>
-            <a:off x="2918429" y="474754"/>
-            <a:ext cx="3444932" cy="727745"/>
-          </a:xfrm>
-        </p:spPr>
-        <p:txBody>
-          <a:bodyPr>
-            <a:normAutofit/>
-          </a:bodyPr>
-          <a:lstStyle/>
-          <a:p>
-            <a:r>
-              <a:rPr lang="en-AU" dirty="0"/>
-              <a:t>Home page</a:t>
-            </a:r>
-          </a:p>
-        </p:txBody>
-      </p:sp>
-      <p:sp>
-        <p:nvSpPr>
-          <p:cNvPr id="7" name="AutoShape 4">
-            <a:extLst>
-              <a:ext uri="{FF2B5EF4-FFF2-40B4-BE49-F238E27FC236}">
-                <a16:creationId xmlns:a16="http://schemas.microsoft.com/office/drawing/2014/main" id="{912E7F26-AC93-46B0-91A2-4CCB1D045E31}"/>
-              </a:ext>
-            </a:extLst>
-          </p:cNvPr>
-          <p:cNvSpPr>
-            <a:spLocks noChangeAspect="1" noChangeArrowheads="1"/>
-          </p:cNvSpPr>
-          <p:nvPr/>
-        </p:nvSpPr>
-        <p:spPr bwMode="auto">
-          <a:xfrm>
-            <a:off x="5943600" y="3276600"/>
-            <a:ext cx="304800" cy="304800"/>
-          </a:xfrm>
-          <a:prstGeom prst="rect">
-            <a:avLst/>
-          </a:prstGeom>
-          <a:noFill/>
-          <a:extLst>
-            <a:ext uri="{909E8E84-426E-40DD-AFC4-6F175D3DCCD1}">
-              <a14:hiddenFill xmlns:a14="http://schemas.microsoft.com/office/drawing/2010/main">
-                <a:solidFill>
-                  <a:srgbClr val="FFFFFF"/>
-                </a:solidFill>
-              </a14:hiddenFill>
-            </a:ext>
-          </a:extLst>
-        </p:spPr>
-        <p:txBody>
-          <a:bodyPr vert="horz" wrap="square" lIns="91440" tIns="45720" rIns="91440" bIns="45720" numCol="1" anchor="t" anchorCtr="0" compatLnSpc="1">
-            <a:prstTxWarp prst="textNoShape">
-              <a:avLst/>
-            </a:prstTxWarp>
-          </a:bodyPr>
-          <a:lstStyle/>
-          <a:p>
-            <a:endParaRPr lang="en-AU"/>
-          </a:p>
-        </p:txBody>
-      </p:sp>
-      <p:pic>
-        <p:nvPicPr>
-          <p:cNvPr id="10" name="Picture 9" descr="Diagram&#10;&#10;Description automatically generated">
-            <a:extLst>
-              <a:ext uri="{FF2B5EF4-FFF2-40B4-BE49-F238E27FC236}">
-                <a16:creationId xmlns:a16="http://schemas.microsoft.com/office/drawing/2014/main" id="{599AC93B-DAB3-4822-98C3-618725D43BBF}"/>
-              </a:ext>
-            </a:extLst>
-          </p:cNvPr>
-          <p:cNvPicPr>
-            <a:picLocks noChangeAspect="1"/>
-          </p:cNvPicPr>
-          <p:nvPr/>
-        </p:nvPicPr>
-        <p:blipFill>
-          <a:blip r:embed="rId2">
-            <a:extLst>
-              <a:ext uri="{28A0092B-C50C-407E-A947-70E740481C1C}">
-                <a14:useLocalDpi xmlns:a14="http://schemas.microsoft.com/office/drawing/2010/main" val="0"/>
-              </a:ext>
-            </a:extLst>
-          </a:blip>
-          <a:stretch>
-            <a:fillRect/>
-          </a:stretch>
-        </p:blipFill>
-        <p:spPr>
-          <a:xfrm>
-            <a:off x="1147072" y="685417"/>
-            <a:ext cx="9897856" cy="5487166"/>
-          </a:xfrm>
-          <a:prstGeom prst="rect">
-            <a:avLst/>
-          </a:prstGeom>
-        </p:spPr>
-      </p:pic>
-    </p:spTree>
-    <p:extLst>
-      <p:ext uri="{BB962C8B-B14F-4D97-AF65-F5344CB8AC3E}">
-        <p14:creationId xmlns:p14="http://schemas.microsoft.com/office/powerpoint/2010/main" val="1624170056"/>
-      </p:ext>
-    </p:extLst>
-  </p:cSld>
-  <p:clrMapOvr>
-    <a:masterClrMapping/>
-  </p:clrMapOvr>
-</p:sld>
-</file>
-
-<file path=ppt/slides/slide3.xml><?xml version="1.0" encoding="utf-8"?>
-<p:sld xmlns:a="http://schemas.openxmlformats.org/drawingml/2006/main" xmlns:r="http://schemas.openxmlformats.org/officeDocument/2006/relationships" xmlns:p="http://schemas.openxmlformats.org/presentationml/2006/main">
-  <p:cSld>
-    <p:spTree>
-      <p:nvGrpSpPr>
-        <p:cNvPr id="1" name=""/>
-        <p:cNvGrpSpPr/>
-        <p:nvPr/>
-      </p:nvGrpSpPr>
-      <p:grpSpPr>
-        <a:xfrm>
-          <a:off x="0" y="0"/>
-          <a:ext cx="0" cy="0"/>
-          <a:chOff x="0" y="0"/>
-          <a:chExt cx="0" cy="0"/>
-        </a:xfrm>
-      </p:grpSpPr>
-      <p:sp>
-        <p:nvSpPr>
-          <p:cNvPr id="2" name="Title 1">
-            <a:extLst>
-              <a:ext uri="{FF2B5EF4-FFF2-40B4-BE49-F238E27FC236}">
-                <a16:creationId xmlns:a16="http://schemas.microsoft.com/office/drawing/2014/main" id="{80DCE892-9C23-4284-8536-497B96B14A2E}"/>
-              </a:ext>
-            </a:extLst>
-          </p:cNvPr>
-          <p:cNvSpPr>
-            <a:spLocks noGrp="1"/>
-          </p:cNvSpPr>
-          <p:nvPr>
-            <p:ph type="title"/>
-          </p:nvPr>
-        </p:nvSpPr>
-        <p:spPr>
-          <a:xfrm>
-            <a:off x="2918428" y="474754"/>
-            <a:ext cx="4321615" cy="727745"/>
-          </a:xfrm>
-        </p:spPr>
-        <p:txBody>
-          <a:bodyPr>
-            <a:normAutofit/>
-          </a:bodyPr>
-          <a:lstStyle/>
-          <a:p>
-            <a:r>
-              <a:rPr lang="en-AU" dirty="0"/>
-              <a:t>Flight Detail page</a:t>
-            </a:r>
-          </a:p>
-        </p:txBody>
-      </p:sp>
-      <p:pic>
-        <p:nvPicPr>
-          <p:cNvPr id="9" name="Picture 8" descr="Table&#10;&#10;Description automatically generated">
-            <a:extLst>
-              <a:ext uri="{FF2B5EF4-FFF2-40B4-BE49-F238E27FC236}">
-                <a16:creationId xmlns:a16="http://schemas.microsoft.com/office/drawing/2014/main" id="{9AC581BE-C719-4EB0-87CA-4A6EAD324575}"/>
-              </a:ext>
-            </a:extLst>
-          </p:cNvPr>
-          <p:cNvPicPr>
-            <a:picLocks noChangeAspect="1"/>
-          </p:cNvPicPr>
-          <p:nvPr/>
-        </p:nvPicPr>
-        <p:blipFill>
-          <a:blip r:embed="rId2">
-            <a:extLst>
-              <a:ext uri="{28A0092B-C50C-407E-A947-70E740481C1C}">
-                <a14:useLocalDpi xmlns:a14="http://schemas.microsoft.com/office/drawing/2010/main" val="0"/>
-              </a:ext>
-            </a:extLst>
-          </a:blip>
-          <a:stretch>
-            <a:fillRect/>
-          </a:stretch>
-        </p:blipFill>
-        <p:spPr>
-          <a:xfrm>
-            <a:off x="1207248" y="1327344"/>
-            <a:ext cx="7999384" cy="4203312"/>
-          </a:xfrm>
-          <a:prstGeom prst="rect">
-            <a:avLst/>
-          </a:prstGeom>
-        </p:spPr>
-      </p:pic>
-    </p:spTree>
-    <p:extLst>
-      <p:ext uri="{BB962C8B-B14F-4D97-AF65-F5344CB8AC3E}">
-        <p14:creationId xmlns:p14="http://schemas.microsoft.com/office/powerpoint/2010/main" val="2993694068"/>
-      </p:ext>
-    </p:extLst>
-  </p:cSld>
-  <p:clrMapOvr>
-    <a:masterClrMapping/>
-  </p:clrMapOvr>
-</p:sld>
-</file>
-
-<file path=ppt/slides/slide4.xml><?xml version="1.0" encoding="utf-8"?>
-<p:sld xmlns:a="http://schemas.openxmlformats.org/drawingml/2006/main" xmlns:r="http://schemas.openxmlformats.org/officeDocument/2006/relationships" xmlns:p="http://schemas.openxmlformats.org/presentationml/2006/main">
-  <p:cSld>
-    <p:spTree>
-      <p:nvGrpSpPr>
-        <p:cNvPr id="1" name=""/>
-        <p:cNvGrpSpPr/>
-        <p:nvPr/>
-      </p:nvGrpSpPr>
-      <p:grpSpPr>
-        <a:xfrm>
-          <a:off x="0" y="0"/>
-          <a:ext cx="0" cy="0"/>
-          <a:chOff x="0" y="0"/>
-          <a:chExt cx="0" cy="0"/>
-        </a:xfrm>
-      </p:grpSpPr>
-      <p:sp>
-        <p:nvSpPr>
-          <p:cNvPr id="2" name="Title 1">
-            <a:extLst>
-              <a:ext uri="{FF2B5EF4-FFF2-40B4-BE49-F238E27FC236}">
-                <a16:creationId xmlns:a16="http://schemas.microsoft.com/office/drawing/2014/main" id="{80DCE892-9C23-4284-8536-497B96B14A2E}"/>
-              </a:ext>
-            </a:extLst>
-          </p:cNvPr>
-          <p:cNvSpPr>
-            <a:spLocks noGrp="1"/>
-          </p:cNvSpPr>
-          <p:nvPr>
-            <p:ph type="title"/>
-          </p:nvPr>
-        </p:nvSpPr>
-        <p:spPr>
-          <a:xfrm>
-            <a:off x="2918428" y="474754"/>
+            <a:off x="2918428" y="-10436"/>
             <a:ext cx="5135808" cy="727745"/>
           </a:xfrm>
         </p:spPr>
@@ -6480,10 +6236,10 @@
       </p:sp>
       <p:pic>
         <p:nvPicPr>
-          <p:cNvPr id="11" name="Picture 10">
+          <p:cNvPr id="4" name="Picture 3">
             <a:extLst>
               <a:ext uri="{FF2B5EF4-FFF2-40B4-BE49-F238E27FC236}">
-                <a16:creationId xmlns:a16="http://schemas.microsoft.com/office/drawing/2014/main" id="{4B4307AE-C1A1-4A35-BF36-C3B9F69484CD}"/>
+                <a16:creationId xmlns:a16="http://schemas.microsoft.com/office/drawing/2014/main" id="{5D5B13BE-B414-4055-9ED2-C141F232EFE7}"/>
               </a:ext>
             </a:extLst>
           </p:cNvPr>
@@ -6494,13 +6250,13 @@
         </p:nvPicPr>
         <p:blipFill rotWithShape="1">
           <a:blip r:embed="rId2"/>
-          <a:srcRect l="16850" t="18996" r="16781" b="11781"/>
+          <a:srcRect l="23342" t="12789" r="23469" b="7755"/>
           <a:stretch/>
         </p:blipFill>
         <p:spPr>
           <a:xfrm>
-            <a:off x="1402915" y="1315232"/>
-            <a:ext cx="8091814" cy="4747365"/>
+            <a:off x="2243943" y="717309"/>
+            <a:ext cx="6484777" cy="5449077"/>
           </a:xfrm>
           <a:prstGeom prst="rect">
             <a:avLst/>
@@ -6520,7 +6276,7 @@
 </p:sld>
 </file>
 
-<file path=ppt/slides/slide5.xml><?xml version="1.0" encoding="utf-8"?>
+<file path=ppt/slides/slide3.xml><?xml version="1.0" encoding="utf-8"?>
 <p:sld xmlns:a="http://schemas.openxmlformats.org/drawingml/2006/main" xmlns:r="http://schemas.openxmlformats.org/officeDocument/2006/relationships" xmlns:p="http://schemas.openxmlformats.org/presentationml/2006/main">
   <p:cSld>
     <p:spTree>

</xml_diff>